<commit_message>
Siste versjon av presentation
</commit_message>
<xml_diff>
--- a/Documentation/Presentation.pptx
+++ b/Documentation/Presentation.pptx
@@ -11497,6 +11497,15 @@
               <a:t>Klasser</a:t>
             </a:r>
           </a:p>
+          <a:p>
+            <a:r>
+              <a:rPr lang="nb-NO" dirty="0"/>
+              <a:t>Db</a:t>
+            </a:r>
+          </a:p>
+          <a:p>
+            <a:endParaRPr lang="nb-NO" dirty="0"/>
+          </a:p>
         </p:txBody>
       </p:sp>
       <p:pic>
@@ -12643,15 +12652,11 @@
               </a:lnSpc>
             </a:pPr>
             <a:r>
-              <a:rPr lang="nb-NO" dirty="0" err="1"/>
-              <a:t>Daily</a:t>
-            </a:r>
-            <a:r>
               <a:rPr lang="nb-NO" dirty="0"/>
-              <a:t> </a:t>
-            </a:r>
-            <a:r>
-              <a:rPr lang="nb-NO" dirty="0" err="1"/>
+              <a:t>Stand-up </a:t>
+            </a:r>
+            <a:r>
+              <a:rPr lang="nb-NO"/>
               <a:t>meetings</a:t>
             </a:r>
             <a:endParaRPr lang="nb-NO" dirty="0"/>

</xml_diff>

<commit_message>
La til mappe for kode + gui så langt. Ikke legg GUI eller klassene som gjør noe inn i GUI eller Classes, jeg ordner det senere
</commit_message>
<xml_diff>
--- a/Documentation/Presentation.pptx
+++ b/Documentation/Presentation.pptx
@@ -217,7 +217,7 @@
           <a:p>
             <a:fld id="{04A86478-5479-FE4E-BB09-7028D6F0565C}" type="datetimeFigureOut">
               <a:rPr lang="nb-NO" smtClean="0"/>
-              <a:t>13.09.2017</a:t>
+              <a:t>14.09.2017</a:t>
             </a:fld>
             <a:endParaRPr lang="nb-NO"/>
           </a:p>
@@ -631,7 +631,7 @@
           <a:p>
             <a:fld id="{EE92B428-2E8E-4888-91F2-EBD4B7AC95A5}" type="datetimeFigureOut">
               <a:rPr lang="nb-NO" smtClean="0"/>
-              <a:t>13.09.2017</a:t>
+              <a:t>14.09.2017</a:t>
             </a:fld>
             <a:endParaRPr lang="nb-NO"/>
           </a:p>
@@ -829,7 +829,7 @@
           <a:p>
             <a:fld id="{EE92B428-2E8E-4888-91F2-EBD4B7AC95A5}" type="datetimeFigureOut">
               <a:rPr lang="nb-NO" smtClean="0"/>
-              <a:t>13.09.2017</a:t>
+              <a:t>14.09.2017</a:t>
             </a:fld>
             <a:endParaRPr lang="nb-NO"/>
           </a:p>
@@ -1037,7 +1037,7 @@
           <a:p>
             <a:fld id="{EE92B428-2E8E-4888-91F2-EBD4B7AC95A5}" type="datetimeFigureOut">
               <a:rPr lang="nb-NO" smtClean="0"/>
-              <a:t>13.09.2017</a:t>
+              <a:t>14.09.2017</a:t>
             </a:fld>
             <a:endParaRPr lang="nb-NO"/>
           </a:p>
@@ -1235,7 +1235,7 @@
           <a:p>
             <a:fld id="{EE92B428-2E8E-4888-91F2-EBD4B7AC95A5}" type="datetimeFigureOut">
               <a:rPr lang="nb-NO" smtClean="0"/>
-              <a:t>13.09.2017</a:t>
+              <a:t>14.09.2017</a:t>
             </a:fld>
             <a:endParaRPr lang="nb-NO"/>
           </a:p>
@@ -1510,7 +1510,7 @@
           <a:p>
             <a:fld id="{EE92B428-2E8E-4888-91F2-EBD4B7AC95A5}" type="datetimeFigureOut">
               <a:rPr lang="nb-NO" smtClean="0"/>
-              <a:t>13.09.2017</a:t>
+              <a:t>14.09.2017</a:t>
             </a:fld>
             <a:endParaRPr lang="nb-NO"/>
           </a:p>
@@ -1775,7 +1775,7 @@
           <a:p>
             <a:fld id="{EE92B428-2E8E-4888-91F2-EBD4B7AC95A5}" type="datetimeFigureOut">
               <a:rPr lang="nb-NO" smtClean="0"/>
-              <a:t>13.09.2017</a:t>
+              <a:t>14.09.2017</a:t>
             </a:fld>
             <a:endParaRPr lang="nb-NO"/>
           </a:p>
@@ -2187,7 +2187,7 @@
           <a:p>
             <a:fld id="{EE92B428-2E8E-4888-91F2-EBD4B7AC95A5}" type="datetimeFigureOut">
               <a:rPr lang="nb-NO" smtClean="0"/>
-              <a:t>13.09.2017</a:t>
+              <a:t>14.09.2017</a:t>
             </a:fld>
             <a:endParaRPr lang="nb-NO"/>
           </a:p>
@@ -2328,7 +2328,7 @@
           <a:p>
             <a:fld id="{EE92B428-2E8E-4888-91F2-EBD4B7AC95A5}" type="datetimeFigureOut">
               <a:rPr lang="nb-NO" smtClean="0"/>
-              <a:t>13.09.2017</a:t>
+              <a:t>14.09.2017</a:t>
             </a:fld>
             <a:endParaRPr lang="nb-NO"/>
           </a:p>
@@ -2441,7 +2441,7 @@
           <a:p>
             <a:fld id="{EE92B428-2E8E-4888-91F2-EBD4B7AC95A5}" type="datetimeFigureOut">
               <a:rPr lang="nb-NO" smtClean="0"/>
-              <a:t>13.09.2017</a:t>
+              <a:t>14.09.2017</a:t>
             </a:fld>
             <a:endParaRPr lang="nb-NO"/>
           </a:p>
@@ -2752,7 +2752,7 @@
           <a:p>
             <a:fld id="{EE92B428-2E8E-4888-91F2-EBD4B7AC95A5}" type="datetimeFigureOut">
               <a:rPr lang="nb-NO" smtClean="0"/>
-              <a:t>13.09.2017</a:t>
+              <a:t>14.09.2017</a:t>
             </a:fld>
             <a:endParaRPr lang="nb-NO"/>
           </a:p>
@@ -3040,7 +3040,7 @@
           <a:p>
             <a:fld id="{EE92B428-2E8E-4888-91F2-EBD4B7AC95A5}" type="datetimeFigureOut">
               <a:rPr lang="nb-NO" smtClean="0"/>
-              <a:t>13.09.2017</a:t>
+              <a:t>14.09.2017</a:t>
             </a:fld>
             <a:endParaRPr lang="nb-NO"/>
           </a:p>
@@ -3281,7 +3281,7 @@
           <a:p>
             <a:fld id="{EE92B428-2E8E-4888-91F2-EBD4B7AC95A5}" type="datetimeFigureOut">
               <a:rPr lang="nb-NO" smtClean="0"/>
-              <a:t>13.09.2017</a:t>
+              <a:t>14.09.2017</a:t>
             </a:fld>
             <a:endParaRPr lang="nb-NO"/>
           </a:p>
@@ -3902,7 +3902,7 @@
             </a:r>
             <a:r>
               <a:rPr lang="nb-NO" sz="1600" dirty="0"/>
-              <a:t>	??????</a:t>
+              <a:t>	718721</a:t>
             </a:r>
           </a:p>
           <a:p>

</xml_diff>